<commit_message>
Update mit Schriftgröße und Textfeldern
</commit_message>
<xml_diff>
--- a/Template_Final_Presentation.pptx
+++ b/Template_Final_Presentation.pptx
@@ -7,8 +7,10 @@
   <p:sldIdLst>
     <p:sldId id="257" r:id="rId2"/>
     <p:sldId id="259" r:id="rId3"/>
-    <p:sldId id="260" r:id="rId4"/>
-    <p:sldId id="258" r:id="rId5"/>
+    <p:sldId id="261" r:id="rId4"/>
+    <p:sldId id="262" r:id="rId5"/>
+    <p:sldId id="260" r:id="rId6"/>
+    <p:sldId id="263" r:id="rId7"/>
   </p:sldIdLst>
   <p:sldSz cx="12192000" cy="6858000"/>
   <p:notesSz cx="6858000" cy="9144000"/>
@@ -275,7 +277,7 @@
           <a:p>
             <a:fld id="{3102E1FB-8F07-44D7-848C-07962476A7A9}" type="datetimeFigureOut">
               <a:rPr lang="en-US" smtClean="0"/>
-              <a:t>7/2/2023</a:t>
+              <a:t>7/11/2023</a:t>
             </a:fld>
             <a:endParaRPr lang="en-US"/>
           </a:p>
@@ -475,7 +477,7 @@
           <a:p>
             <a:fld id="{3102E1FB-8F07-44D7-848C-07962476A7A9}" type="datetimeFigureOut">
               <a:rPr lang="en-US" smtClean="0"/>
-              <a:t>7/2/2023</a:t>
+              <a:t>7/11/2023</a:t>
             </a:fld>
             <a:endParaRPr lang="en-US"/>
           </a:p>
@@ -685,7 +687,7 @@
           <a:p>
             <a:fld id="{3102E1FB-8F07-44D7-848C-07962476A7A9}" type="datetimeFigureOut">
               <a:rPr lang="en-US" smtClean="0"/>
-              <a:t>7/2/2023</a:t>
+              <a:t>7/11/2023</a:t>
             </a:fld>
             <a:endParaRPr lang="en-US"/>
           </a:p>
@@ -885,7 +887,7 @@
           <a:p>
             <a:fld id="{3102E1FB-8F07-44D7-848C-07962476A7A9}" type="datetimeFigureOut">
               <a:rPr lang="en-US" smtClean="0"/>
-              <a:t>7/2/2023</a:t>
+              <a:t>7/11/2023</a:t>
             </a:fld>
             <a:endParaRPr lang="en-US"/>
           </a:p>
@@ -1161,7 +1163,7 @@
           <a:p>
             <a:fld id="{3102E1FB-8F07-44D7-848C-07962476A7A9}" type="datetimeFigureOut">
               <a:rPr lang="en-US" smtClean="0"/>
-              <a:t>7/2/2023</a:t>
+              <a:t>7/11/2023</a:t>
             </a:fld>
             <a:endParaRPr lang="en-US"/>
           </a:p>
@@ -1429,7 +1431,7 @@
           <a:p>
             <a:fld id="{3102E1FB-8F07-44D7-848C-07962476A7A9}" type="datetimeFigureOut">
               <a:rPr lang="en-US" smtClean="0"/>
-              <a:t>7/2/2023</a:t>
+              <a:t>7/11/2023</a:t>
             </a:fld>
             <a:endParaRPr lang="en-US"/>
           </a:p>
@@ -1844,7 +1846,7 @@
           <a:p>
             <a:fld id="{3102E1FB-8F07-44D7-848C-07962476A7A9}" type="datetimeFigureOut">
               <a:rPr lang="en-US" smtClean="0"/>
-              <a:t>7/2/2023</a:t>
+              <a:t>7/11/2023</a:t>
             </a:fld>
             <a:endParaRPr lang="en-US"/>
           </a:p>
@@ -1986,7 +1988,7 @@
           <a:p>
             <a:fld id="{3102E1FB-8F07-44D7-848C-07962476A7A9}" type="datetimeFigureOut">
               <a:rPr lang="en-US" smtClean="0"/>
-              <a:t>7/2/2023</a:t>
+              <a:t>7/11/2023</a:t>
             </a:fld>
             <a:endParaRPr lang="en-US"/>
           </a:p>
@@ -2099,7 +2101,7 @@
           <a:p>
             <a:fld id="{3102E1FB-8F07-44D7-848C-07962476A7A9}" type="datetimeFigureOut">
               <a:rPr lang="en-US" smtClean="0"/>
-              <a:t>7/2/2023</a:t>
+              <a:t>7/11/2023</a:t>
             </a:fld>
             <a:endParaRPr lang="en-US"/>
           </a:p>
@@ -2412,7 +2414,7 @@
           <a:p>
             <a:fld id="{3102E1FB-8F07-44D7-848C-07962476A7A9}" type="datetimeFigureOut">
               <a:rPr lang="en-US" smtClean="0"/>
-              <a:t>7/2/2023</a:t>
+              <a:t>7/11/2023</a:t>
             </a:fld>
             <a:endParaRPr lang="en-US"/>
           </a:p>
@@ -2701,7 +2703,7 @@
           <a:p>
             <a:fld id="{3102E1FB-8F07-44D7-848C-07962476A7A9}" type="datetimeFigureOut">
               <a:rPr lang="en-US" smtClean="0"/>
-              <a:t>7/2/2023</a:t>
+              <a:t>7/11/2023</a:t>
             </a:fld>
             <a:endParaRPr lang="en-US"/>
           </a:p>
@@ -2944,7 +2946,7 @@
           <a:p>
             <a:fld id="{3102E1FB-8F07-44D7-848C-07962476A7A9}" type="datetimeFigureOut">
               <a:rPr lang="en-US" smtClean="0"/>
-              <a:t>7/2/2023</a:t>
+              <a:t>7/11/2023</a:t>
             </a:fld>
             <a:endParaRPr lang="en-US"/>
           </a:p>
@@ -3857,6 +3859,219 @@
           </a:p>
         </p:txBody>
       </p:sp>
+      <p:sp>
+        <p:nvSpPr>
+          <p:cNvPr id="3" name="Textfeld 2">
+            <a:extLst>
+              <a:ext uri="{FF2B5EF4-FFF2-40B4-BE49-F238E27FC236}">
+                <a16:creationId xmlns:a16="http://schemas.microsoft.com/office/drawing/2014/main" id="{3BF84B42-8642-B5E9-DB4C-97123A5349C0}"/>
+              </a:ext>
+            </a:extLst>
+          </p:cNvPr>
+          <p:cNvSpPr txBox="1"/>
+          <p:nvPr/>
+        </p:nvSpPr>
+        <p:spPr>
+          <a:xfrm>
+            <a:off x="298175" y="123446"/>
+            <a:ext cx="5807764" cy="369332"/>
+          </a:xfrm>
+          <a:prstGeom prst="rect">
+            <a:avLst/>
+          </a:prstGeom>
+          <a:noFill/>
+        </p:spPr>
+        <p:txBody>
+          <a:bodyPr wrap="square" rtlCol="0">
+            <a:spAutoFit/>
+          </a:bodyPr>
+          <a:lstStyle/>
+          <a:p>
+            <a:r>
+              <a:rPr lang="en-US" dirty="0"/>
+              <a:t>Biological Background  </a:t>
+            </a:r>
+            <a:r>
+              <a:rPr lang="en-US" dirty="0">
+                <a:solidFill>
+                  <a:srgbClr val="808080"/>
+                </a:solidFill>
+                <a:sym typeface="Symbol" panose="05050102010706020507" pitchFamily="18" charset="2"/>
+              </a:rPr>
+              <a:t>  Results    Outlook </a:t>
+            </a:r>
+            <a:endParaRPr lang="en-US" dirty="0">
+              <a:solidFill>
+                <a:srgbClr val="808080"/>
+              </a:solidFill>
+            </a:endParaRPr>
+          </a:p>
+        </p:txBody>
+      </p:sp>
+      <p:sp>
+        <p:nvSpPr>
+          <p:cNvPr id="4" name="Textfeld 3">
+            <a:extLst>
+              <a:ext uri="{FF2B5EF4-FFF2-40B4-BE49-F238E27FC236}">
+                <a16:creationId xmlns:a16="http://schemas.microsoft.com/office/drawing/2014/main" id="{F88CB21D-319C-FF63-3712-B58E05662E98}"/>
+              </a:ext>
+            </a:extLst>
+          </p:cNvPr>
+          <p:cNvSpPr txBox="1"/>
+          <p:nvPr/>
+        </p:nvSpPr>
+        <p:spPr>
+          <a:xfrm>
+            <a:off x="11499574" y="95075"/>
+            <a:ext cx="516835" cy="369332"/>
+          </a:xfrm>
+          <a:prstGeom prst="rect">
+            <a:avLst/>
+          </a:prstGeom>
+          <a:noFill/>
+        </p:spPr>
+        <p:txBody>
+          <a:bodyPr wrap="square" rtlCol="0">
+            <a:spAutoFit/>
+          </a:bodyPr>
+          <a:lstStyle/>
+          <a:p>
+            <a:r>
+              <a:rPr lang="en-US" dirty="0"/>
+              <a:t>02</a:t>
+            </a:r>
+          </a:p>
+        </p:txBody>
+      </p:sp>
+      <p:sp>
+        <p:nvSpPr>
+          <p:cNvPr id="5" name="Textfeld 4">
+            <a:extLst>
+              <a:ext uri="{FF2B5EF4-FFF2-40B4-BE49-F238E27FC236}">
+                <a16:creationId xmlns:a16="http://schemas.microsoft.com/office/drawing/2014/main" id="{9D35D034-ED1A-471C-5799-E3DE44D512F9}"/>
+              </a:ext>
+            </a:extLst>
+          </p:cNvPr>
+          <p:cNvSpPr txBox="1"/>
+          <p:nvPr/>
+        </p:nvSpPr>
+        <p:spPr>
+          <a:xfrm>
+            <a:off x="288235" y="6254450"/>
+            <a:ext cx="11728173" cy="276999"/>
+          </a:xfrm>
+          <a:prstGeom prst="rect">
+            <a:avLst/>
+          </a:prstGeom>
+          <a:noFill/>
+        </p:spPr>
+        <p:txBody>
+          <a:bodyPr wrap="square" rtlCol="0">
+            <a:spAutoFit/>
+          </a:bodyPr>
+          <a:lstStyle/>
+          <a:p>
+            <a:r>
+              <a:rPr lang="en-US" sz="1200" dirty="0">
+                <a:solidFill>
+                  <a:srgbClr val="808080"/>
+                </a:solidFill>
+              </a:rPr>
+              <a:t># Source # </a:t>
+            </a:r>
+          </a:p>
+        </p:txBody>
+      </p:sp>
+      <p:sp>
+        <p:nvSpPr>
+          <p:cNvPr id="6" name="Textfeld 5">
+            <a:extLst>
+              <a:ext uri="{FF2B5EF4-FFF2-40B4-BE49-F238E27FC236}">
+                <a16:creationId xmlns:a16="http://schemas.microsoft.com/office/drawing/2014/main" id="{D71BBC45-186F-5C75-2B25-BA75DF442F61}"/>
+              </a:ext>
+            </a:extLst>
+          </p:cNvPr>
+          <p:cNvSpPr txBox="1"/>
+          <p:nvPr/>
+        </p:nvSpPr>
+        <p:spPr>
+          <a:xfrm>
+            <a:off x="298175" y="586410"/>
+            <a:ext cx="11579087" cy="707886"/>
+          </a:xfrm>
+          <a:prstGeom prst="rect">
+            <a:avLst/>
+          </a:prstGeom>
+          <a:noFill/>
+        </p:spPr>
+        <p:txBody>
+          <a:bodyPr wrap="square" rtlCol="0">
+            <a:spAutoFit/>
+          </a:bodyPr>
+          <a:lstStyle/>
+          <a:p>
+            <a:r>
+              <a:rPr lang="en-US" sz="4000" b="1" dirty="0">
+                <a:solidFill>
+                  <a:schemeClr val="bg1"/>
+                </a:solidFill>
+              </a:rPr>
+              <a:t># </a:t>
+            </a:r>
+            <a:r>
+              <a:rPr lang="en-US" sz="4000" b="1" dirty="0" err="1">
+                <a:solidFill>
+                  <a:schemeClr val="bg1"/>
+                </a:solidFill>
+              </a:rPr>
+              <a:t>Überschrift</a:t>
+            </a:r>
+            <a:r>
+              <a:rPr lang="en-US" sz="4000" b="1" dirty="0">
+                <a:solidFill>
+                  <a:schemeClr val="bg1"/>
+                </a:solidFill>
+              </a:rPr>
+              <a:t> #</a:t>
+            </a:r>
+          </a:p>
+        </p:txBody>
+      </p:sp>
+      <p:sp>
+        <p:nvSpPr>
+          <p:cNvPr id="7" name="Textfeld 6">
+            <a:extLst>
+              <a:ext uri="{FF2B5EF4-FFF2-40B4-BE49-F238E27FC236}">
+                <a16:creationId xmlns:a16="http://schemas.microsoft.com/office/drawing/2014/main" id="{D4D41EAA-9717-E025-5E23-D9943B1D82FC}"/>
+              </a:ext>
+            </a:extLst>
+          </p:cNvPr>
+          <p:cNvSpPr txBox="1"/>
+          <p:nvPr/>
+        </p:nvSpPr>
+        <p:spPr>
+          <a:xfrm>
+            <a:off x="288235" y="1610139"/>
+            <a:ext cx="11589026" cy="400110"/>
+          </a:xfrm>
+          <a:prstGeom prst="rect">
+            <a:avLst/>
+          </a:prstGeom>
+          <a:noFill/>
+        </p:spPr>
+        <p:txBody>
+          <a:bodyPr wrap="square" rtlCol="0">
+            <a:spAutoFit/>
+          </a:bodyPr>
+          <a:lstStyle/>
+          <a:p>
+            <a:r>
+              <a:rPr lang="en-US" sz="2000" dirty="0"/>
+              <a:t># Text #</a:t>
+            </a:r>
+          </a:p>
+        </p:txBody>
+      </p:sp>
     </p:spTree>
     <p:extLst>
       <p:ext uri="{BB962C8B-B14F-4D97-AF65-F5344CB8AC3E}">
@@ -3901,8 +4116,8 @@
         </p:nvSpPr>
         <p:spPr>
           <a:xfrm>
-            <a:off x="288236" y="268357"/>
-            <a:ext cx="11589026" cy="6301409"/>
+            <a:off x="288236" y="496958"/>
+            <a:ext cx="11589026" cy="884582"/>
           </a:xfrm>
           <a:prstGeom prst="rect">
             <a:avLst/>
@@ -3939,10 +4154,340 @@
           </a:p>
         </p:txBody>
       </p:sp>
+      <p:cxnSp>
+        <p:nvCxnSpPr>
+          <p:cNvPr id="8" name="Gerader Verbinder 7">
+            <a:extLst>
+              <a:ext uri="{FF2B5EF4-FFF2-40B4-BE49-F238E27FC236}">
+                <a16:creationId xmlns:a16="http://schemas.microsoft.com/office/drawing/2014/main" id="{A967309D-E383-F13E-1D3E-DCADD492DBB9}"/>
+              </a:ext>
+            </a:extLst>
+          </p:cNvPr>
+          <p:cNvCxnSpPr>
+            <a:cxnSpLocks/>
+          </p:cNvCxnSpPr>
+          <p:nvPr/>
+        </p:nvCxnSpPr>
+        <p:spPr>
+          <a:xfrm>
+            <a:off x="288236" y="6530009"/>
+            <a:ext cx="11589026" cy="0"/>
+          </a:xfrm>
+          <a:prstGeom prst="line">
+            <a:avLst/>
+          </a:prstGeom>
+          <a:ln w="12700">
+            <a:solidFill>
+              <a:srgbClr val="808080"/>
+            </a:solidFill>
+          </a:ln>
+        </p:spPr>
+        <p:style>
+          <a:lnRef idx="1">
+            <a:schemeClr val="accent1"/>
+          </a:lnRef>
+          <a:fillRef idx="0">
+            <a:schemeClr val="accent1"/>
+          </a:fillRef>
+          <a:effectRef idx="0">
+            <a:schemeClr val="accent1"/>
+          </a:effectRef>
+          <a:fontRef idx="minor">
+            <a:schemeClr val="tx1"/>
+          </a:fontRef>
+        </p:style>
+      </p:cxnSp>
+      <p:sp>
+        <p:nvSpPr>
+          <p:cNvPr id="14" name="Textfeld 13">
+            <a:extLst>
+              <a:ext uri="{FF2B5EF4-FFF2-40B4-BE49-F238E27FC236}">
+                <a16:creationId xmlns:a16="http://schemas.microsoft.com/office/drawing/2014/main" id="{D2AF56CB-7B24-1286-5C9D-66DEEEA02F0F}"/>
+              </a:ext>
+            </a:extLst>
+          </p:cNvPr>
+          <p:cNvSpPr txBox="1"/>
+          <p:nvPr/>
+        </p:nvSpPr>
+        <p:spPr>
+          <a:xfrm>
+            <a:off x="268358" y="6561123"/>
+            <a:ext cx="11589026" cy="276999"/>
+          </a:xfrm>
+          <a:prstGeom prst="rect">
+            <a:avLst/>
+          </a:prstGeom>
+          <a:noFill/>
+        </p:spPr>
+        <p:txBody>
+          <a:bodyPr wrap="square" rtlCol="0">
+            <a:spAutoFit/>
+          </a:bodyPr>
+          <a:lstStyle/>
+          <a:p>
+            <a:r>
+              <a:rPr lang="en-US" sz="1200" dirty="0">
+                <a:solidFill>
+                  <a:srgbClr val="3D597C"/>
+                </a:solidFill>
+              </a:rPr>
+              <a:t>Proteome-wide Screen for RNA-dependent Proteins I Team 3: HeLa Cells Synchronized in Interphase I Summer Term 2023 I 19.07.2023 I Supervisor: Dr. Ma</a:t>
+            </a:r>
+            <a:r>
+              <a:rPr lang="de-DE" sz="1200" dirty="0">
+                <a:solidFill>
+                  <a:srgbClr val="3D597C"/>
+                </a:solidFill>
+              </a:rPr>
+              <a:t>ï</a:t>
+            </a:r>
+            <a:r>
+              <a:rPr lang="en-US" sz="1200" dirty="0">
+                <a:solidFill>
+                  <a:srgbClr val="3D597C"/>
+                </a:solidFill>
+              </a:rPr>
+              <a:t>wen Caudron-Herger</a:t>
+            </a:r>
+          </a:p>
+        </p:txBody>
+      </p:sp>
+      <p:sp>
+        <p:nvSpPr>
+          <p:cNvPr id="3" name="Textfeld 2">
+            <a:extLst>
+              <a:ext uri="{FF2B5EF4-FFF2-40B4-BE49-F238E27FC236}">
+                <a16:creationId xmlns:a16="http://schemas.microsoft.com/office/drawing/2014/main" id="{3BF84B42-8642-B5E9-DB4C-97123A5349C0}"/>
+              </a:ext>
+            </a:extLst>
+          </p:cNvPr>
+          <p:cNvSpPr txBox="1"/>
+          <p:nvPr/>
+        </p:nvSpPr>
+        <p:spPr>
+          <a:xfrm>
+            <a:off x="298175" y="123446"/>
+            <a:ext cx="5807764" cy="369332"/>
+          </a:xfrm>
+          <a:prstGeom prst="rect">
+            <a:avLst/>
+          </a:prstGeom>
+          <a:noFill/>
+        </p:spPr>
+        <p:txBody>
+          <a:bodyPr wrap="square" rtlCol="0">
+            <a:spAutoFit/>
+          </a:bodyPr>
+          <a:lstStyle/>
+          <a:p>
+            <a:r>
+              <a:rPr lang="en-US" dirty="0">
+                <a:solidFill>
+                  <a:srgbClr val="808080"/>
+                </a:solidFill>
+              </a:rPr>
+              <a:t>Biological Background  </a:t>
+            </a:r>
+            <a:r>
+              <a:rPr lang="en-US" dirty="0">
+                <a:solidFill>
+                  <a:srgbClr val="808080"/>
+                </a:solidFill>
+                <a:sym typeface="Symbol" panose="05050102010706020507" pitchFamily="18" charset="2"/>
+              </a:rPr>
+              <a:t>  </a:t>
+            </a:r>
+            <a:r>
+              <a:rPr lang="en-US" dirty="0">
+                <a:sym typeface="Symbol" panose="05050102010706020507" pitchFamily="18" charset="2"/>
+              </a:rPr>
+              <a:t>Results</a:t>
+            </a:r>
+            <a:r>
+              <a:rPr lang="en-US" dirty="0">
+                <a:solidFill>
+                  <a:srgbClr val="808080"/>
+                </a:solidFill>
+                <a:sym typeface="Symbol" panose="05050102010706020507" pitchFamily="18" charset="2"/>
+              </a:rPr>
+              <a:t>    Outlook </a:t>
+            </a:r>
+            <a:endParaRPr lang="en-US" dirty="0">
+              <a:solidFill>
+                <a:srgbClr val="808080"/>
+              </a:solidFill>
+            </a:endParaRPr>
+          </a:p>
+        </p:txBody>
+      </p:sp>
+      <p:sp>
+        <p:nvSpPr>
+          <p:cNvPr id="4" name="Textfeld 3">
+            <a:extLst>
+              <a:ext uri="{FF2B5EF4-FFF2-40B4-BE49-F238E27FC236}">
+                <a16:creationId xmlns:a16="http://schemas.microsoft.com/office/drawing/2014/main" id="{F88CB21D-319C-FF63-3712-B58E05662E98}"/>
+              </a:ext>
+            </a:extLst>
+          </p:cNvPr>
+          <p:cNvSpPr txBox="1"/>
+          <p:nvPr/>
+        </p:nvSpPr>
+        <p:spPr>
+          <a:xfrm>
+            <a:off x="11499574" y="95075"/>
+            <a:ext cx="516835" cy="369332"/>
+          </a:xfrm>
+          <a:prstGeom prst="rect">
+            <a:avLst/>
+          </a:prstGeom>
+          <a:noFill/>
+        </p:spPr>
+        <p:txBody>
+          <a:bodyPr wrap="square" rtlCol="0">
+            <a:spAutoFit/>
+          </a:bodyPr>
+          <a:lstStyle/>
+          <a:p>
+            <a:r>
+              <a:rPr lang="en-US" dirty="0"/>
+              <a:t>04</a:t>
+            </a:r>
+          </a:p>
+        </p:txBody>
+      </p:sp>
+      <p:sp>
+        <p:nvSpPr>
+          <p:cNvPr id="5" name="Textfeld 4">
+            <a:extLst>
+              <a:ext uri="{FF2B5EF4-FFF2-40B4-BE49-F238E27FC236}">
+                <a16:creationId xmlns:a16="http://schemas.microsoft.com/office/drawing/2014/main" id="{9D35D034-ED1A-471C-5799-E3DE44D512F9}"/>
+              </a:ext>
+            </a:extLst>
+          </p:cNvPr>
+          <p:cNvSpPr txBox="1"/>
+          <p:nvPr/>
+        </p:nvSpPr>
+        <p:spPr>
+          <a:xfrm>
+            <a:off x="288235" y="6244511"/>
+            <a:ext cx="11728173" cy="276999"/>
+          </a:xfrm>
+          <a:prstGeom prst="rect">
+            <a:avLst/>
+          </a:prstGeom>
+          <a:noFill/>
+        </p:spPr>
+        <p:txBody>
+          <a:bodyPr wrap="square" rtlCol="0">
+            <a:spAutoFit/>
+          </a:bodyPr>
+          <a:lstStyle/>
+          <a:p>
+            <a:r>
+              <a:rPr lang="en-US" sz="1200" dirty="0">
+                <a:solidFill>
+                  <a:srgbClr val="808080"/>
+                </a:solidFill>
+              </a:rPr>
+              <a:t># Source # </a:t>
+            </a:r>
+          </a:p>
+        </p:txBody>
+      </p:sp>
+      <p:sp>
+        <p:nvSpPr>
+          <p:cNvPr id="6" name="Textfeld 5">
+            <a:extLst>
+              <a:ext uri="{FF2B5EF4-FFF2-40B4-BE49-F238E27FC236}">
+                <a16:creationId xmlns:a16="http://schemas.microsoft.com/office/drawing/2014/main" id="{D71BBC45-186F-5C75-2B25-BA75DF442F61}"/>
+              </a:ext>
+            </a:extLst>
+          </p:cNvPr>
+          <p:cNvSpPr txBox="1"/>
+          <p:nvPr/>
+        </p:nvSpPr>
+        <p:spPr>
+          <a:xfrm>
+            <a:off x="298175" y="586410"/>
+            <a:ext cx="11579087" cy="707886"/>
+          </a:xfrm>
+          <a:prstGeom prst="rect">
+            <a:avLst/>
+          </a:prstGeom>
+          <a:noFill/>
+        </p:spPr>
+        <p:txBody>
+          <a:bodyPr wrap="square" rtlCol="0">
+            <a:spAutoFit/>
+          </a:bodyPr>
+          <a:lstStyle/>
+          <a:p>
+            <a:r>
+              <a:rPr lang="en-US" sz="4000" b="1" dirty="0">
+                <a:solidFill>
+                  <a:schemeClr val="bg1"/>
+                </a:solidFill>
+              </a:rPr>
+              <a:t># </a:t>
+            </a:r>
+            <a:r>
+              <a:rPr lang="en-US" sz="4000" b="1" dirty="0" err="1">
+                <a:solidFill>
+                  <a:schemeClr val="bg1"/>
+                </a:solidFill>
+              </a:rPr>
+              <a:t>Überschrift</a:t>
+            </a:r>
+            <a:r>
+              <a:rPr lang="en-US" sz="4000" b="1" dirty="0">
+                <a:solidFill>
+                  <a:schemeClr val="bg1"/>
+                </a:solidFill>
+              </a:rPr>
+              <a:t> #</a:t>
+            </a:r>
+          </a:p>
+        </p:txBody>
+      </p:sp>
+      <p:sp>
+        <p:nvSpPr>
+          <p:cNvPr id="7" name="Textfeld 6">
+            <a:extLst>
+              <a:ext uri="{FF2B5EF4-FFF2-40B4-BE49-F238E27FC236}">
+                <a16:creationId xmlns:a16="http://schemas.microsoft.com/office/drawing/2014/main" id="{D4D41EAA-9717-E025-5E23-D9943B1D82FC}"/>
+              </a:ext>
+            </a:extLst>
+          </p:cNvPr>
+          <p:cNvSpPr txBox="1"/>
+          <p:nvPr/>
+        </p:nvSpPr>
+        <p:spPr>
+          <a:xfrm>
+            <a:off x="288235" y="1610139"/>
+            <a:ext cx="11589026" cy="400110"/>
+          </a:xfrm>
+          <a:prstGeom prst="rect">
+            <a:avLst/>
+          </a:prstGeom>
+          <a:noFill/>
+        </p:spPr>
+        <p:txBody>
+          <a:bodyPr wrap="square" rtlCol="0">
+            <a:spAutoFit/>
+          </a:bodyPr>
+          <a:lstStyle/>
+          <a:p>
+            <a:r>
+              <a:rPr lang="en-US" sz="2000" dirty="0"/>
+              <a:t># Text #</a:t>
+            </a:r>
+          </a:p>
+        </p:txBody>
+      </p:sp>
     </p:spTree>
     <p:extLst>
       <p:ext uri="{BB962C8B-B14F-4D97-AF65-F5344CB8AC3E}">
-        <p14:creationId xmlns:p14="http://schemas.microsoft.com/office/powerpoint/2010/main" val="4087225167"/>
+        <p14:creationId xmlns:p14="http://schemas.microsoft.com/office/powerpoint/2010/main" val="3905453532"/>
       </p:ext>
     </p:extLst>
   </p:cSld>
@@ -3969,10 +4514,897 @@
           <a:chExt cx="0" cy="0"/>
         </a:xfrm>
       </p:grpSpPr>
+      <p:sp>
+        <p:nvSpPr>
+          <p:cNvPr id="2" name="Rechteck 1">
+            <a:extLst>
+              <a:ext uri="{FF2B5EF4-FFF2-40B4-BE49-F238E27FC236}">
+                <a16:creationId xmlns:a16="http://schemas.microsoft.com/office/drawing/2014/main" id="{4923676B-AAED-C154-C21D-FCE15F839EEE}"/>
+              </a:ext>
+            </a:extLst>
+          </p:cNvPr>
+          <p:cNvSpPr/>
+          <p:nvPr/>
+        </p:nvSpPr>
+        <p:spPr>
+          <a:xfrm>
+            <a:off x="288236" y="496958"/>
+            <a:ext cx="11589026" cy="884582"/>
+          </a:xfrm>
+          <a:prstGeom prst="rect">
+            <a:avLst/>
+          </a:prstGeom>
+          <a:solidFill>
+            <a:srgbClr val="3D597C"/>
+          </a:solidFill>
+          <a:ln>
+            <a:noFill/>
+          </a:ln>
+        </p:spPr>
+        <p:style>
+          <a:lnRef idx="2">
+            <a:schemeClr val="accent1">
+              <a:shade val="15000"/>
+            </a:schemeClr>
+          </a:lnRef>
+          <a:fillRef idx="1">
+            <a:schemeClr val="accent1"/>
+          </a:fillRef>
+          <a:effectRef idx="0">
+            <a:schemeClr val="accent1"/>
+          </a:effectRef>
+          <a:fontRef idx="minor">
+            <a:schemeClr val="lt1"/>
+          </a:fontRef>
+        </p:style>
+        <p:txBody>
+          <a:bodyPr rtlCol="0" anchor="ctr"/>
+          <a:lstStyle/>
+          <a:p>
+            <a:pPr algn="ctr"/>
+            <a:endParaRPr lang="en-US"/>
+          </a:p>
+        </p:txBody>
+      </p:sp>
+      <p:cxnSp>
+        <p:nvCxnSpPr>
+          <p:cNvPr id="8" name="Gerader Verbinder 7">
+            <a:extLst>
+              <a:ext uri="{FF2B5EF4-FFF2-40B4-BE49-F238E27FC236}">
+                <a16:creationId xmlns:a16="http://schemas.microsoft.com/office/drawing/2014/main" id="{A967309D-E383-F13E-1D3E-DCADD492DBB9}"/>
+              </a:ext>
+            </a:extLst>
+          </p:cNvPr>
+          <p:cNvCxnSpPr>
+            <a:cxnSpLocks/>
+          </p:cNvCxnSpPr>
+          <p:nvPr/>
+        </p:nvCxnSpPr>
+        <p:spPr>
+          <a:xfrm>
+            <a:off x="288236" y="6530009"/>
+            <a:ext cx="11589026" cy="0"/>
+          </a:xfrm>
+          <a:prstGeom prst="line">
+            <a:avLst/>
+          </a:prstGeom>
+          <a:ln w="12700">
+            <a:solidFill>
+              <a:srgbClr val="808080"/>
+            </a:solidFill>
+          </a:ln>
+        </p:spPr>
+        <p:style>
+          <a:lnRef idx="1">
+            <a:schemeClr val="accent1"/>
+          </a:lnRef>
+          <a:fillRef idx="0">
+            <a:schemeClr val="accent1"/>
+          </a:fillRef>
+          <a:effectRef idx="0">
+            <a:schemeClr val="accent1"/>
+          </a:effectRef>
+          <a:fontRef idx="minor">
+            <a:schemeClr val="tx1"/>
+          </a:fontRef>
+        </p:style>
+      </p:cxnSp>
+      <p:sp>
+        <p:nvSpPr>
+          <p:cNvPr id="14" name="Textfeld 13">
+            <a:extLst>
+              <a:ext uri="{FF2B5EF4-FFF2-40B4-BE49-F238E27FC236}">
+                <a16:creationId xmlns:a16="http://schemas.microsoft.com/office/drawing/2014/main" id="{D2AF56CB-7B24-1286-5C9D-66DEEEA02F0F}"/>
+              </a:ext>
+            </a:extLst>
+          </p:cNvPr>
+          <p:cNvSpPr txBox="1"/>
+          <p:nvPr/>
+        </p:nvSpPr>
+        <p:spPr>
+          <a:xfrm>
+            <a:off x="268358" y="6561123"/>
+            <a:ext cx="11589026" cy="276999"/>
+          </a:xfrm>
+          <a:prstGeom prst="rect">
+            <a:avLst/>
+          </a:prstGeom>
+          <a:noFill/>
+        </p:spPr>
+        <p:txBody>
+          <a:bodyPr wrap="square" rtlCol="0">
+            <a:spAutoFit/>
+          </a:bodyPr>
+          <a:lstStyle/>
+          <a:p>
+            <a:r>
+              <a:rPr lang="en-US" sz="1200" dirty="0">
+                <a:solidFill>
+                  <a:srgbClr val="3D597C"/>
+                </a:solidFill>
+              </a:rPr>
+              <a:t>Proteome-wide Screen for RNA-dependent Proteins I Team 3: HeLa Cells Synchronized in Interphase I Summer Term 2023 I 19.07.2023 I Supervisor: Dr. Ma</a:t>
+            </a:r>
+            <a:r>
+              <a:rPr lang="de-DE" sz="1200" dirty="0">
+                <a:solidFill>
+                  <a:srgbClr val="3D597C"/>
+                </a:solidFill>
+              </a:rPr>
+              <a:t>ï</a:t>
+            </a:r>
+            <a:r>
+              <a:rPr lang="en-US" sz="1200" dirty="0">
+                <a:solidFill>
+                  <a:srgbClr val="3D597C"/>
+                </a:solidFill>
+              </a:rPr>
+              <a:t>wen Caudron-Herger</a:t>
+            </a:r>
+          </a:p>
+        </p:txBody>
+      </p:sp>
+      <p:sp>
+        <p:nvSpPr>
+          <p:cNvPr id="3" name="Textfeld 2">
+            <a:extLst>
+              <a:ext uri="{FF2B5EF4-FFF2-40B4-BE49-F238E27FC236}">
+                <a16:creationId xmlns:a16="http://schemas.microsoft.com/office/drawing/2014/main" id="{3BF84B42-8642-B5E9-DB4C-97123A5349C0}"/>
+              </a:ext>
+            </a:extLst>
+          </p:cNvPr>
+          <p:cNvSpPr txBox="1"/>
+          <p:nvPr/>
+        </p:nvSpPr>
+        <p:spPr>
+          <a:xfrm>
+            <a:off x="298175" y="123446"/>
+            <a:ext cx="5807764" cy="369332"/>
+          </a:xfrm>
+          <a:prstGeom prst="rect">
+            <a:avLst/>
+          </a:prstGeom>
+          <a:noFill/>
+        </p:spPr>
+        <p:txBody>
+          <a:bodyPr wrap="square" rtlCol="0">
+            <a:spAutoFit/>
+          </a:bodyPr>
+          <a:lstStyle/>
+          <a:p>
+            <a:r>
+              <a:rPr lang="en-US" dirty="0">
+                <a:solidFill>
+                  <a:srgbClr val="808080"/>
+                </a:solidFill>
+              </a:rPr>
+              <a:t>Biological Background  </a:t>
+            </a:r>
+            <a:r>
+              <a:rPr lang="en-US" dirty="0">
+                <a:solidFill>
+                  <a:srgbClr val="808080"/>
+                </a:solidFill>
+                <a:sym typeface="Symbol" panose="05050102010706020507" pitchFamily="18" charset="2"/>
+              </a:rPr>
+              <a:t>  Results    </a:t>
+            </a:r>
+            <a:r>
+              <a:rPr lang="en-US" dirty="0">
+                <a:sym typeface="Symbol" panose="05050102010706020507" pitchFamily="18" charset="2"/>
+              </a:rPr>
+              <a:t>Outlook </a:t>
+            </a:r>
+            <a:endParaRPr lang="en-US" dirty="0"/>
+          </a:p>
+        </p:txBody>
+      </p:sp>
+      <p:sp>
+        <p:nvSpPr>
+          <p:cNvPr id="4" name="Textfeld 3">
+            <a:extLst>
+              <a:ext uri="{FF2B5EF4-FFF2-40B4-BE49-F238E27FC236}">
+                <a16:creationId xmlns:a16="http://schemas.microsoft.com/office/drawing/2014/main" id="{F88CB21D-319C-FF63-3712-B58E05662E98}"/>
+              </a:ext>
+            </a:extLst>
+          </p:cNvPr>
+          <p:cNvSpPr txBox="1"/>
+          <p:nvPr/>
+        </p:nvSpPr>
+        <p:spPr>
+          <a:xfrm>
+            <a:off x="11499574" y="95075"/>
+            <a:ext cx="516835" cy="369332"/>
+          </a:xfrm>
+          <a:prstGeom prst="rect">
+            <a:avLst/>
+          </a:prstGeom>
+          <a:noFill/>
+        </p:spPr>
+        <p:txBody>
+          <a:bodyPr wrap="square" rtlCol="0">
+            <a:spAutoFit/>
+          </a:bodyPr>
+          <a:lstStyle/>
+          <a:p>
+            <a:r>
+              <a:rPr lang="en-US" dirty="0"/>
+              <a:t>14</a:t>
+            </a:r>
+          </a:p>
+        </p:txBody>
+      </p:sp>
+      <p:sp>
+        <p:nvSpPr>
+          <p:cNvPr id="5" name="Textfeld 4">
+            <a:extLst>
+              <a:ext uri="{FF2B5EF4-FFF2-40B4-BE49-F238E27FC236}">
+                <a16:creationId xmlns:a16="http://schemas.microsoft.com/office/drawing/2014/main" id="{9D35D034-ED1A-471C-5799-E3DE44D512F9}"/>
+              </a:ext>
+            </a:extLst>
+          </p:cNvPr>
+          <p:cNvSpPr txBox="1"/>
+          <p:nvPr/>
+        </p:nvSpPr>
+        <p:spPr>
+          <a:xfrm>
+            <a:off x="288235" y="6244511"/>
+            <a:ext cx="11728173" cy="276999"/>
+          </a:xfrm>
+          <a:prstGeom prst="rect">
+            <a:avLst/>
+          </a:prstGeom>
+          <a:noFill/>
+        </p:spPr>
+        <p:txBody>
+          <a:bodyPr wrap="square" rtlCol="0">
+            <a:spAutoFit/>
+          </a:bodyPr>
+          <a:lstStyle/>
+          <a:p>
+            <a:r>
+              <a:rPr lang="en-US" sz="1200" dirty="0">
+                <a:solidFill>
+                  <a:srgbClr val="808080"/>
+                </a:solidFill>
+              </a:rPr>
+              <a:t># Source # </a:t>
+            </a:r>
+          </a:p>
+        </p:txBody>
+      </p:sp>
+      <p:sp>
+        <p:nvSpPr>
+          <p:cNvPr id="6" name="Textfeld 5">
+            <a:extLst>
+              <a:ext uri="{FF2B5EF4-FFF2-40B4-BE49-F238E27FC236}">
+                <a16:creationId xmlns:a16="http://schemas.microsoft.com/office/drawing/2014/main" id="{D71BBC45-186F-5C75-2B25-BA75DF442F61}"/>
+              </a:ext>
+            </a:extLst>
+          </p:cNvPr>
+          <p:cNvSpPr txBox="1"/>
+          <p:nvPr/>
+        </p:nvSpPr>
+        <p:spPr>
+          <a:xfrm>
+            <a:off x="298175" y="586410"/>
+            <a:ext cx="11579087" cy="707886"/>
+          </a:xfrm>
+          <a:prstGeom prst="rect">
+            <a:avLst/>
+          </a:prstGeom>
+          <a:noFill/>
+        </p:spPr>
+        <p:txBody>
+          <a:bodyPr wrap="square" rtlCol="0">
+            <a:spAutoFit/>
+          </a:bodyPr>
+          <a:lstStyle/>
+          <a:p>
+            <a:r>
+              <a:rPr lang="en-US" sz="4000" b="1" dirty="0">
+                <a:solidFill>
+                  <a:schemeClr val="bg1"/>
+                </a:solidFill>
+              </a:rPr>
+              <a:t># </a:t>
+            </a:r>
+            <a:r>
+              <a:rPr lang="en-US" sz="4000" b="1" dirty="0" err="1">
+                <a:solidFill>
+                  <a:schemeClr val="bg1"/>
+                </a:solidFill>
+              </a:rPr>
+              <a:t>Überschrift</a:t>
+            </a:r>
+            <a:r>
+              <a:rPr lang="en-US" sz="4000" b="1" dirty="0">
+                <a:solidFill>
+                  <a:schemeClr val="bg1"/>
+                </a:solidFill>
+              </a:rPr>
+              <a:t> #</a:t>
+            </a:r>
+          </a:p>
+        </p:txBody>
+      </p:sp>
+      <p:sp>
+        <p:nvSpPr>
+          <p:cNvPr id="7" name="Textfeld 6">
+            <a:extLst>
+              <a:ext uri="{FF2B5EF4-FFF2-40B4-BE49-F238E27FC236}">
+                <a16:creationId xmlns:a16="http://schemas.microsoft.com/office/drawing/2014/main" id="{D4D41EAA-9717-E025-5E23-D9943B1D82FC}"/>
+              </a:ext>
+            </a:extLst>
+          </p:cNvPr>
+          <p:cNvSpPr txBox="1"/>
+          <p:nvPr/>
+        </p:nvSpPr>
+        <p:spPr>
+          <a:xfrm>
+            <a:off x="288235" y="1610139"/>
+            <a:ext cx="11589026" cy="400110"/>
+          </a:xfrm>
+          <a:prstGeom prst="rect">
+            <a:avLst/>
+          </a:prstGeom>
+          <a:noFill/>
+        </p:spPr>
+        <p:txBody>
+          <a:bodyPr wrap="square" rtlCol="0">
+            <a:spAutoFit/>
+          </a:bodyPr>
+          <a:lstStyle/>
+          <a:p>
+            <a:r>
+              <a:rPr lang="en-US" sz="2000" dirty="0"/>
+              <a:t># Text #</a:t>
+            </a:r>
+          </a:p>
+        </p:txBody>
+      </p:sp>
     </p:spTree>
     <p:extLst>
       <p:ext uri="{BB962C8B-B14F-4D97-AF65-F5344CB8AC3E}">
-        <p14:creationId xmlns:p14="http://schemas.microsoft.com/office/powerpoint/2010/main" val="2581621080"/>
+        <p14:creationId xmlns:p14="http://schemas.microsoft.com/office/powerpoint/2010/main" val="3351326044"/>
+      </p:ext>
+    </p:extLst>
+  </p:cSld>
+  <p:clrMapOvr>
+    <a:masterClrMapping/>
+  </p:clrMapOvr>
+</p:sld>
+</file>
+
+<file path=ppt/slides/slide5.xml><?xml version="1.0" encoding="utf-8"?>
+<p:sld xmlns:a="http://schemas.openxmlformats.org/drawingml/2006/main" xmlns:r="http://schemas.openxmlformats.org/officeDocument/2006/relationships" xmlns:p="http://schemas.openxmlformats.org/presentationml/2006/main">
+  <p:cSld>
+    <p:spTree>
+      <p:nvGrpSpPr>
+        <p:cNvPr id="1" name=""/>
+        <p:cNvGrpSpPr/>
+        <p:nvPr/>
+      </p:nvGrpSpPr>
+      <p:grpSpPr>
+        <a:xfrm>
+          <a:off x="0" y="0"/>
+          <a:ext cx="0" cy="0"/>
+          <a:chOff x="0" y="0"/>
+          <a:chExt cx="0" cy="0"/>
+        </a:xfrm>
+      </p:grpSpPr>
+      <p:sp>
+        <p:nvSpPr>
+          <p:cNvPr id="2" name="Rechteck 1">
+            <a:extLst>
+              <a:ext uri="{FF2B5EF4-FFF2-40B4-BE49-F238E27FC236}">
+                <a16:creationId xmlns:a16="http://schemas.microsoft.com/office/drawing/2014/main" id="{4923676B-AAED-C154-C21D-FCE15F839EEE}"/>
+              </a:ext>
+            </a:extLst>
+          </p:cNvPr>
+          <p:cNvSpPr/>
+          <p:nvPr/>
+        </p:nvSpPr>
+        <p:spPr>
+          <a:xfrm>
+            <a:off x="288236" y="268357"/>
+            <a:ext cx="11589026" cy="6301409"/>
+          </a:xfrm>
+          <a:prstGeom prst="rect">
+            <a:avLst/>
+          </a:prstGeom>
+          <a:solidFill>
+            <a:srgbClr val="3D597C"/>
+          </a:solidFill>
+          <a:ln>
+            <a:noFill/>
+          </a:ln>
+        </p:spPr>
+        <p:style>
+          <a:lnRef idx="2">
+            <a:schemeClr val="accent1">
+              <a:shade val="15000"/>
+            </a:schemeClr>
+          </a:lnRef>
+          <a:fillRef idx="1">
+            <a:schemeClr val="accent1"/>
+          </a:fillRef>
+          <a:effectRef idx="0">
+            <a:schemeClr val="accent1"/>
+          </a:effectRef>
+          <a:fontRef idx="minor">
+            <a:schemeClr val="lt1"/>
+          </a:fontRef>
+        </p:style>
+        <p:txBody>
+          <a:bodyPr rtlCol="0" anchor="ctr"/>
+          <a:lstStyle/>
+          <a:p>
+            <a:pPr algn="ctr"/>
+            <a:endParaRPr lang="en-US"/>
+          </a:p>
+        </p:txBody>
+      </p:sp>
+      <p:sp>
+        <p:nvSpPr>
+          <p:cNvPr id="3" name="Textfeld 2">
+            <a:extLst>
+              <a:ext uri="{FF2B5EF4-FFF2-40B4-BE49-F238E27FC236}">
+                <a16:creationId xmlns:a16="http://schemas.microsoft.com/office/drawing/2014/main" id="{7E1251E1-32ED-21F2-7044-F9161984C14B}"/>
+              </a:ext>
+            </a:extLst>
+          </p:cNvPr>
+          <p:cNvSpPr txBox="1"/>
+          <p:nvPr/>
+        </p:nvSpPr>
+        <p:spPr>
+          <a:xfrm>
+            <a:off x="834886" y="655983"/>
+            <a:ext cx="2435087" cy="769441"/>
+          </a:xfrm>
+          <a:prstGeom prst="rect">
+            <a:avLst/>
+          </a:prstGeom>
+          <a:noFill/>
+        </p:spPr>
+        <p:txBody>
+          <a:bodyPr wrap="square" rtlCol="0">
+            <a:spAutoFit/>
+          </a:bodyPr>
+          <a:lstStyle/>
+          <a:p>
+            <a:r>
+              <a:rPr lang="en-US" sz="4400" b="1" dirty="0">
+                <a:solidFill>
+                  <a:schemeClr val="bg1"/>
+                </a:solidFill>
+              </a:rPr>
+              <a:t>Backup</a:t>
+            </a:r>
+          </a:p>
+        </p:txBody>
+      </p:sp>
+    </p:spTree>
+    <p:extLst>
+      <p:ext uri="{BB962C8B-B14F-4D97-AF65-F5344CB8AC3E}">
+        <p14:creationId xmlns:p14="http://schemas.microsoft.com/office/powerpoint/2010/main" val="4087225167"/>
+      </p:ext>
+    </p:extLst>
+  </p:cSld>
+  <p:clrMapOvr>
+    <a:masterClrMapping/>
+  </p:clrMapOvr>
+</p:sld>
+</file>
+
+<file path=ppt/slides/slide6.xml><?xml version="1.0" encoding="utf-8"?>
+<p:sld xmlns:a="http://schemas.openxmlformats.org/drawingml/2006/main" xmlns:r="http://schemas.openxmlformats.org/officeDocument/2006/relationships" xmlns:p="http://schemas.openxmlformats.org/presentationml/2006/main">
+  <p:cSld>
+    <p:spTree>
+      <p:nvGrpSpPr>
+        <p:cNvPr id="1" name=""/>
+        <p:cNvGrpSpPr/>
+        <p:nvPr/>
+      </p:nvGrpSpPr>
+      <p:grpSpPr>
+        <a:xfrm>
+          <a:off x="0" y="0"/>
+          <a:ext cx="0" cy="0"/>
+          <a:chOff x="0" y="0"/>
+          <a:chExt cx="0" cy="0"/>
+        </a:xfrm>
+      </p:grpSpPr>
+      <p:sp>
+        <p:nvSpPr>
+          <p:cNvPr id="2" name="Rechteck 1">
+            <a:extLst>
+              <a:ext uri="{FF2B5EF4-FFF2-40B4-BE49-F238E27FC236}">
+                <a16:creationId xmlns:a16="http://schemas.microsoft.com/office/drawing/2014/main" id="{4923676B-AAED-C154-C21D-FCE15F839EEE}"/>
+              </a:ext>
+            </a:extLst>
+          </p:cNvPr>
+          <p:cNvSpPr/>
+          <p:nvPr/>
+        </p:nvSpPr>
+        <p:spPr>
+          <a:xfrm>
+            <a:off x="288236" y="496958"/>
+            <a:ext cx="11589026" cy="884582"/>
+          </a:xfrm>
+          <a:prstGeom prst="rect">
+            <a:avLst/>
+          </a:prstGeom>
+          <a:solidFill>
+            <a:srgbClr val="3D597C"/>
+          </a:solidFill>
+          <a:ln>
+            <a:noFill/>
+          </a:ln>
+        </p:spPr>
+        <p:style>
+          <a:lnRef idx="2">
+            <a:schemeClr val="accent1">
+              <a:shade val="15000"/>
+            </a:schemeClr>
+          </a:lnRef>
+          <a:fillRef idx="1">
+            <a:schemeClr val="accent1"/>
+          </a:fillRef>
+          <a:effectRef idx="0">
+            <a:schemeClr val="accent1"/>
+          </a:effectRef>
+          <a:fontRef idx="minor">
+            <a:schemeClr val="lt1"/>
+          </a:fontRef>
+        </p:style>
+        <p:txBody>
+          <a:bodyPr rtlCol="0" anchor="ctr"/>
+          <a:lstStyle/>
+          <a:p>
+            <a:pPr algn="ctr"/>
+            <a:endParaRPr lang="en-US"/>
+          </a:p>
+        </p:txBody>
+      </p:sp>
+      <p:cxnSp>
+        <p:nvCxnSpPr>
+          <p:cNvPr id="8" name="Gerader Verbinder 7">
+            <a:extLst>
+              <a:ext uri="{FF2B5EF4-FFF2-40B4-BE49-F238E27FC236}">
+                <a16:creationId xmlns:a16="http://schemas.microsoft.com/office/drawing/2014/main" id="{A967309D-E383-F13E-1D3E-DCADD492DBB9}"/>
+              </a:ext>
+            </a:extLst>
+          </p:cNvPr>
+          <p:cNvCxnSpPr>
+            <a:cxnSpLocks/>
+          </p:cNvCxnSpPr>
+          <p:nvPr/>
+        </p:nvCxnSpPr>
+        <p:spPr>
+          <a:xfrm>
+            <a:off x="288236" y="6530009"/>
+            <a:ext cx="11589026" cy="0"/>
+          </a:xfrm>
+          <a:prstGeom prst="line">
+            <a:avLst/>
+          </a:prstGeom>
+          <a:ln w="12700">
+            <a:solidFill>
+              <a:srgbClr val="808080"/>
+            </a:solidFill>
+          </a:ln>
+        </p:spPr>
+        <p:style>
+          <a:lnRef idx="1">
+            <a:schemeClr val="accent1"/>
+          </a:lnRef>
+          <a:fillRef idx="0">
+            <a:schemeClr val="accent1"/>
+          </a:fillRef>
+          <a:effectRef idx="0">
+            <a:schemeClr val="accent1"/>
+          </a:effectRef>
+          <a:fontRef idx="minor">
+            <a:schemeClr val="tx1"/>
+          </a:fontRef>
+        </p:style>
+      </p:cxnSp>
+      <p:sp>
+        <p:nvSpPr>
+          <p:cNvPr id="14" name="Textfeld 13">
+            <a:extLst>
+              <a:ext uri="{FF2B5EF4-FFF2-40B4-BE49-F238E27FC236}">
+                <a16:creationId xmlns:a16="http://schemas.microsoft.com/office/drawing/2014/main" id="{D2AF56CB-7B24-1286-5C9D-66DEEEA02F0F}"/>
+              </a:ext>
+            </a:extLst>
+          </p:cNvPr>
+          <p:cNvSpPr txBox="1"/>
+          <p:nvPr/>
+        </p:nvSpPr>
+        <p:spPr>
+          <a:xfrm>
+            <a:off x="268358" y="6561123"/>
+            <a:ext cx="11589026" cy="276999"/>
+          </a:xfrm>
+          <a:prstGeom prst="rect">
+            <a:avLst/>
+          </a:prstGeom>
+          <a:noFill/>
+        </p:spPr>
+        <p:txBody>
+          <a:bodyPr wrap="square" rtlCol="0">
+            <a:spAutoFit/>
+          </a:bodyPr>
+          <a:lstStyle/>
+          <a:p>
+            <a:r>
+              <a:rPr lang="en-US" sz="1200" dirty="0">
+                <a:solidFill>
+                  <a:srgbClr val="3D597C"/>
+                </a:solidFill>
+              </a:rPr>
+              <a:t>Proteome-wide Screen for RNA-dependent Proteins I Team 3: HeLa Cells Synchronized in Interphase I Summer Term 2023 I 19.07.2023 I Supervisor: Dr. Ma</a:t>
+            </a:r>
+            <a:r>
+              <a:rPr lang="de-DE" sz="1200" dirty="0">
+                <a:solidFill>
+                  <a:srgbClr val="3D597C"/>
+                </a:solidFill>
+              </a:rPr>
+              <a:t>ï</a:t>
+            </a:r>
+            <a:r>
+              <a:rPr lang="en-US" sz="1200" dirty="0">
+                <a:solidFill>
+                  <a:srgbClr val="3D597C"/>
+                </a:solidFill>
+              </a:rPr>
+              <a:t>wen Caudron-Herger</a:t>
+            </a:r>
+          </a:p>
+        </p:txBody>
+      </p:sp>
+      <p:sp>
+        <p:nvSpPr>
+          <p:cNvPr id="3" name="Textfeld 2">
+            <a:extLst>
+              <a:ext uri="{FF2B5EF4-FFF2-40B4-BE49-F238E27FC236}">
+                <a16:creationId xmlns:a16="http://schemas.microsoft.com/office/drawing/2014/main" id="{3BF84B42-8642-B5E9-DB4C-97123A5349C0}"/>
+              </a:ext>
+            </a:extLst>
+          </p:cNvPr>
+          <p:cNvSpPr txBox="1"/>
+          <p:nvPr/>
+        </p:nvSpPr>
+        <p:spPr>
+          <a:xfrm>
+            <a:off x="298175" y="123446"/>
+            <a:ext cx="5807764" cy="369332"/>
+          </a:xfrm>
+          <a:prstGeom prst="rect">
+            <a:avLst/>
+          </a:prstGeom>
+          <a:noFill/>
+        </p:spPr>
+        <p:txBody>
+          <a:bodyPr wrap="square" rtlCol="0">
+            <a:spAutoFit/>
+          </a:bodyPr>
+          <a:lstStyle/>
+          <a:p>
+            <a:r>
+              <a:rPr lang="en-US" dirty="0">
+                <a:solidFill>
+                  <a:srgbClr val="808080"/>
+                </a:solidFill>
+              </a:rPr>
+              <a:t>Biological Background  </a:t>
+            </a:r>
+            <a:r>
+              <a:rPr lang="en-US" dirty="0">
+                <a:solidFill>
+                  <a:srgbClr val="808080"/>
+                </a:solidFill>
+                <a:sym typeface="Symbol" panose="05050102010706020507" pitchFamily="18" charset="2"/>
+              </a:rPr>
+              <a:t>  Results    Outlook </a:t>
+            </a:r>
+            <a:endParaRPr lang="en-US" dirty="0">
+              <a:solidFill>
+                <a:srgbClr val="808080"/>
+              </a:solidFill>
+            </a:endParaRPr>
+          </a:p>
+        </p:txBody>
+      </p:sp>
+      <p:sp>
+        <p:nvSpPr>
+          <p:cNvPr id="4" name="Textfeld 3">
+            <a:extLst>
+              <a:ext uri="{FF2B5EF4-FFF2-40B4-BE49-F238E27FC236}">
+                <a16:creationId xmlns:a16="http://schemas.microsoft.com/office/drawing/2014/main" id="{F88CB21D-319C-FF63-3712-B58E05662E98}"/>
+              </a:ext>
+            </a:extLst>
+          </p:cNvPr>
+          <p:cNvSpPr txBox="1"/>
+          <p:nvPr/>
+        </p:nvSpPr>
+        <p:spPr>
+          <a:xfrm>
+            <a:off x="11499574" y="95075"/>
+            <a:ext cx="516835" cy="369332"/>
+          </a:xfrm>
+          <a:prstGeom prst="rect">
+            <a:avLst/>
+          </a:prstGeom>
+          <a:noFill/>
+        </p:spPr>
+        <p:txBody>
+          <a:bodyPr wrap="square" rtlCol="0">
+            <a:spAutoFit/>
+          </a:bodyPr>
+          <a:lstStyle/>
+          <a:p>
+            <a:r>
+              <a:rPr lang="en-US" dirty="0"/>
+              <a:t>16</a:t>
+            </a:r>
+          </a:p>
+        </p:txBody>
+      </p:sp>
+      <p:sp>
+        <p:nvSpPr>
+          <p:cNvPr id="5" name="Textfeld 4">
+            <a:extLst>
+              <a:ext uri="{FF2B5EF4-FFF2-40B4-BE49-F238E27FC236}">
+                <a16:creationId xmlns:a16="http://schemas.microsoft.com/office/drawing/2014/main" id="{9D35D034-ED1A-471C-5799-E3DE44D512F9}"/>
+              </a:ext>
+            </a:extLst>
+          </p:cNvPr>
+          <p:cNvSpPr txBox="1"/>
+          <p:nvPr/>
+        </p:nvSpPr>
+        <p:spPr>
+          <a:xfrm>
+            <a:off x="288235" y="6244511"/>
+            <a:ext cx="11728173" cy="276999"/>
+          </a:xfrm>
+          <a:prstGeom prst="rect">
+            <a:avLst/>
+          </a:prstGeom>
+          <a:noFill/>
+        </p:spPr>
+        <p:txBody>
+          <a:bodyPr wrap="square" rtlCol="0">
+            <a:spAutoFit/>
+          </a:bodyPr>
+          <a:lstStyle/>
+          <a:p>
+            <a:r>
+              <a:rPr lang="en-US" sz="1200" dirty="0">
+                <a:solidFill>
+                  <a:srgbClr val="808080"/>
+                </a:solidFill>
+              </a:rPr>
+              <a:t># Source # </a:t>
+            </a:r>
+          </a:p>
+        </p:txBody>
+      </p:sp>
+      <p:sp>
+        <p:nvSpPr>
+          <p:cNvPr id="6" name="Textfeld 5">
+            <a:extLst>
+              <a:ext uri="{FF2B5EF4-FFF2-40B4-BE49-F238E27FC236}">
+                <a16:creationId xmlns:a16="http://schemas.microsoft.com/office/drawing/2014/main" id="{D71BBC45-186F-5C75-2B25-BA75DF442F61}"/>
+              </a:ext>
+            </a:extLst>
+          </p:cNvPr>
+          <p:cNvSpPr txBox="1"/>
+          <p:nvPr/>
+        </p:nvSpPr>
+        <p:spPr>
+          <a:xfrm>
+            <a:off x="298175" y="586410"/>
+            <a:ext cx="11579087" cy="707886"/>
+          </a:xfrm>
+          <a:prstGeom prst="rect">
+            <a:avLst/>
+          </a:prstGeom>
+          <a:noFill/>
+        </p:spPr>
+        <p:txBody>
+          <a:bodyPr wrap="square" rtlCol="0">
+            <a:spAutoFit/>
+          </a:bodyPr>
+          <a:lstStyle/>
+          <a:p>
+            <a:r>
+              <a:rPr lang="en-US" sz="4000" b="1" dirty="0">
+                <a:solidFill>
+                  <a:schemeClr val="bg1"/>
+                </a:solidFill>
+              </a:rPr>
+              <a:t># </a:t>
+            </a:r>
+            <a:r>
+              <a:rPr lang="en-US" sz="4000" b="1" dirty="0" err="1">
+                <a:solidFill>
+                  <a:schemeClr val="bg1"/>
+                </a:solidFill>
+              </a:rPr>
+              <a:t>Überschrift</a:t>
+            </a:r>
+            <a:r>
+              <a:rPr lang="en-US" sz="4000" b="1" dirty="0">
+                <a:solidFill>
+                  <a:schemeClr val="bg1"/>
+                </a:solidFill>
+              </a:rPr>
+              <a:t> #</a:t>
+            </a:r>
+          </a:p>
+        </p:txBody>
+      </p:sp>
+      <p:sp>
+        <p:nvSpPr>
+          <p:cNvPr id="7" name="Textfeld 6">
+            <a:extLst>
+              <a:ext uri="{FF2B5EF4-FFF2-40B4-BE49-F238E27FC236}">
+                <a16:creationId xmlns:a16="http://schemas.microsoft.com/office/drawing/2014/main" id="{D4D41EAA-9717-E025-5E23-D9943B1D82FC}"/>
+              </a:ext>
+            </a:extLst>
+          </p:cNvPr>
+          <p:cNvSpPr txBox="1"/>
+          <p:nvPr/>
+        </p:nvSpPr>
+        <p:spPr>
+          <a:xfrm>
+            <a:off x="288235" y="1610139"/>
+            <a:ext cx="11589026" cy="400110"/>
+          </a:xfrm>
+          <a:prstGeom prst="rect">
+            <a:avLst/>
+          </a:prstGeom>
+          <a:noFill/>
+        </p:spPr>
+        <p:txBody>
+          <a:bodyPr wrap="square" rtlCol="0">
+            <a:spAutoFit/>
+          </a:bodyPr>
+          <a:lstStyle/>
+          <a:p>
+            <a:r>
+              <a:rPr lang="en-US" sz="2000" dirty="0"/>
+              <a:t># Text #</a:t>
+            </a:r>
+          </a:p>
+        </p:txBody>
+      </p:sp>
+    </p:spTree>
+    <p:extLst>
+      <p:ext uri="{BB962C8B-B14F-4D97-AF65-F5344CB8AC3E}">
+        <p14:creationId xmlns:p14="http://schemas.microsoft.com/office/powerpoint/2010/main" val="677883467"/>
       </p:ext>
     </p:extLst>
   </p:cSld>

</xml_diff>

<commit_message>
Methods als Folie hinzugefügt
</commit_message>
<xml_diff>
--- a/Template_Final_Presentation.pptx
+++ b/Template_Final_Presentation.pptx
@@ -7,10 +7,11 @@
   <p:sldIdLst>
     <p:sldId id="257" r:id="rId2"/>
     <p:sldId id="259" r:id="rId3"/>
-    <p:sldId id="261" r:id="rId4"/>
-    <p:sldId id="262" r:id="rId5"/>
-    <p:sldId id="260" r:id="rId6"/>
-    <p:sldId id="263" r:id="rId7"/>
+    <p:sldId id="264" r:id="rId4"/>
+    <p:sldId id="261" r:id="rId5"/>
+    <p:sldId id="262" r:id="rId6"/>
+    <p:sldId id="260" r:id="rId7"/>
+    <p:sldId id="263" r:id="rId8"/>
   </p:sldIdLst>
   <p:sldSz cx="12192000" cy="6858000"/>
   <p:notesSz cx="6858000" cy="9144000"/>
@@ -277,7 +278,7 @@
           <a:p>
             <a:fld id="{3102E1FB-8F07-44D7-848C-07962476A7A9}" type="datetimeFigureOut">
               <a:rPr lang="en-US" smtClean="0"/>
-              <a:t>7/11/2023</a:t>
+              <a:t>7/12/2023</a:t>
             </a:fld>
             <a:endParaRPr lang="en-US"/>
           </a:p>
@@ -477,7 +478,7 @@
           <a:p>
             <a:fld id="{3102E1FB-8F07-44D7-848C-07962476A7A9}" type="datetimeFigureOut">
               <a:rPr lang="en-US" smtClean="0"/>
-              <a:t>7/11/2023</a:t>
+              <a:t>7/12/2023</a:t>
             </a:fld>
             <a:endParaRPr lang="en-US"/>
           </a:p>
@@ -687,7 +688,7 @@
           <a:p>
             <a:fld id="{3102E1FB-8F07-44D7-848C-07962476A7A9}" type="datetimeFigureOut">
               <a:rPr lang="en-US" smtClean="0"/>
-              <a:t>7/11/2023</a:t>
+              <a:t>7/12/2023</a:t>
             </a:fld>
             <a:endParaRPr lang="en-US"/>
           </a:p>
@@ -887,7 +888,7 @@
           <a:p>
             <a:fld id="{3102E1FB-8F07-44D7-848C-07962476A7A9}" type="datetimeFigureOut">
               <a:rPr lang="en-US" smtClean="0"/>
-              <a:t>7/11/2023</a:t>
+              <a:t>7/12/2023</a:t>
             </a:fld>
             <a:endParaRPr lang="en-US"/>
           </a:p>
@@ -1163,7 +1164,7 @@
           <a:p>
             <a:fld id="{3102E1FB-8F07-44D7-848C-07962476A7A9}" type="datetimeFigureOut">
               <a:rPr lang="en-US" smtClean="0"/>
-              <a:t>7/11/2023</a:t>
+              <a:t>7/12/2023</a:t>
             </a:fld>
             <a:endParaRPr lang="en-US"/>
           </a:p>
@@ -1431,7 +1432,7 @@
           <a:p>
             <a:fld id="{3102E1FB-8F07-44D7-848C-07962476A7A9}" type="datetimeFigureOut">
               <a:rPr lang="en-US" smtClean="0"/>
-              <a:t>7/11/2023</a:t>
+              <a:t>7/12/2023</a:t>
             </a:fld>
             <a:endParaRPr lang="en-US"/>
           </a:p>
@@ -1846,7 +1847,7 @@
           <a:p>
             <a:fld id="{3102E1FB-8F07-44D7-848C-07962476A7A9}" type="datetimeFigureOut">
               <a:rPr lang="en-US" smtClean="0"/>
-              <a:t>7/11/2023</a:t>
+              <a:t>7/12/2023</a:t>
             </a:fld>
             <a:endParaRPr lang="en-US"/>
           </a:p>
@@ -1988,7 +1989,7 @@
           <a:p>
             <a:fld id="{3102E1FB-8F07-44D7-848C-07962476A7A9}" type="datetimeFigureOut">
               <a:rPr lang="en-US" smtClean="0"/>
-              <a:t>7/11/2023</a:t>
+              <a:t>7/12/2023</a:t>
             </a:fld>
             <a:endParaRPr lang="en-US"/>
           </a:p>
@@ -2101,7 +2102,7 @@
           <a:p>
             <a:fld id="{3102E1FB-8F07-44D7-848C-07962476A7A9}" type="datetimeFigureOut">
               <a:rPr lang="en-US" smtClean="0"/>
-              <a:t>7/11/2023</a:t>
+              <a:t>7/12/2023</a:t>
             </a:fld>
             <a:endParaRPr lang="en-US"/>
           </a:p>
@@ -2414,7 +2415,7 @@
           <a:p>
             <a:fld id="{3102E1FB-8F07-44D7-848C-07962476A7A9}" type="datetimeFigureOut">
               <a:rPr lang="en-US" smtClean="0"/>
-              <a:t>7/11/2023</a:t>
+              <a:t>7/12/2023</a:t>
             </a:fld>
             <a:endParaRPr lang="en-US"/>
           </a:p>
@@ -2703,7 +2704,7 @@
           <a:p>
             <a:fld id="{3102E1FB-8F07-44D7-848C-07962476A7A9}" type="datetimeFigureOut">
               <a:rPr lang="en-US" smtClean="0"/>
-              <a:t>7/11/2023</a:t>
+              <a:t>7/12/2023</a:t>
             </a:fld>
             <a:endParaRPr lang="en-US"/>
           </a:p>
@@ -2946,7 +2947,7 @@
           <a:p>
             <a:fld id="{3102E1FB-8F07-44D7-848C-07962476A7A9}" type="datetimeFigureOut">
               <a:rPr lang="en-US" smtClean="0"/>
-              <a:t>7/11/2023</a:t>
+              <a:t>7/12/2023</a:t>
             </a:fld>
             <a:endParaRPr lang="en-US"/>
           </a:p>
@@ -3898,7 +3899,7 @@
                 </a:solidFill>
                 <a:sym typeface="Symbol" panose="05050102010706020507" pitchFamily="18" charset="2"/>
               </a:rPr>
-              <a:t>  Results    Outlook </a:t>
+              <a:t>  Methods    Results    Outlook </a:t>
             </a:r>
             <a:endParaRPr lang="en-US" dirty="0">
               <a:solidFill>
@@ -4301,7 +4302,7 @@
               <a:rPr lang="en-US" dirty="0">
                 <a:sym typeface="Symbol" panose="05050102010706020507" pitchFamily="18" charset="2"/>
               </a:rPr>
-              <a:t>Results</a:t>
+              <a:t>Methods </a:t>
             </a:r>
             <a:r>
               <a:rPr lang="en-US" dirty="0">
@@ -4310,7 +4311,7 @@
                 </a:solidFill>
                 <a:sym typeface="Symbol" panose="05050102010706020507" pitchFamily="18" charset="2"/>
               </a:rPr>
-              <a:t>    Outlook </a:t>
+              <a:t>   Results    Outlook </a:t>
             </a:r>
             <a:endParaRPr lang="en-US" dirty="0">
               <a:solidFill>
@@ -4369,7 +4370,7 @@
         </p:nvSpPr>
         <p:spPr>
           <a:xfrm>
-            <a:off x="288235" y="6244511"/>
+            <a:off x="288235" y="6254450"/>
             <a:ext cx="11728173" cy="276999"/>
           </a:xfrm>
           <a:prstGeom prst="rect">
@@ -4487,7 +4488,7 @@
     </p:spTree>
     <p:extLst>
       <p:ext uri="{BB962C8B-B14F-4D97-AF65-F5344CB8AC3E}">
-        <p14:creationId xmlns:p14="http://schemas.microsoft.com/office/powerpoint/2010/main" val="3905453532"/>
+        <p14:creationId xmlns:p14="http://schemas.microsoft.com/office/powerpoint/2010/main" val="1198768783"/>
       </p:ext>
     </p:extLst>
   </p:cSld>
@@ -4707,15 +4708,28 @@
                 </a:solidFill>
                 <a:sym typeface="Symbol" panose="05050102010706020507" pitchFamily="18" charset="2"/>
               </a:rPr>
-              <a:t>  Results    </a:t>
+              <a:t>  Methods    </a:t>
             </a:r>
             <a:r>
               <a:rPr lang="en-US" dirty="0">
                 <a:sym typeface="Symbol" panose="05050102010706020507" pitchFamily="18" charset="2"/>
               </a:rPr>
-              <a:t>Outlook </a:t>
-            </a:r>
-            <a:endParaRPr lang="en-US" dirty="0"/>
+              <a:t>Results</a:t>
+            </a:r>
+            <a:r>
+              <a:rPr lang="en-US" dirty="0">
+                <a:solidFill>
+                  <a:srgbClr val="808080"/>
+                </a:solidFill>
+                <a:sym typeface="Symbol" panose="05050102010706020507" pitchFamily="18" charset="2"/>
+              </a:rPr>
+              <a:t>    Outlook </a:t>
+            </a:r>
+            <a:endParaRPr lang="en-US" dirty="0">
+              <a:solidFill>
+                <a:srgbClr val="808080"/>
+              </a:solidFill>
+            </a:endParaRPr>
           </a:p>
         </p:txBody>
       </p:sp>
@@ -4749,7 +4763,7 @@
           <a:p>
             <a:r>
               <a:rPr lang="en-US" dirty="0"/>
-              <a:t>14</a:t>
+              <a:t>05</a:t>
             </a:r>
           </a:p>
         </p:txBody>
@@ -4886,7 +4900,7 @@
     </p:spTree>
     <p:extLst>
       <p:ext uri="{BB962C8B-B14F-4D97-AF65-F5344CB8AC3E}">
-        <p14:creationId xmlns:p14="http://schemas.microsoft.com/office/powerpoint/2010/main" val="3351326044"/>
+        <p14:creationId xmlns:p14="http://schemas.microsoft.com/office/powerpoint/2010/main" val="3905453532"/>
       </p:ext>
     </p:extLst>
   </p:cSld>
@@ -4927,8 +4941,8 @@
         </p:nvSpPr>
         <p:spPr>
           <a:xfrm>
-            <a:off x="288236" y="268357"/>
-            <a:ext cx="11589026" cy="6301409"/>
+            <a:off x="288236" y="496958"/>
+            <a:ext cx="11589026" cy="884582"/>
           </a:xfrm>
           <a:prstGeom prst="rect">
             <a:avLst/>
@@ -4965,12 +4979,55 @@
           </a:p>
         </p:txBody>
       </p:sp>
-      <p:sp>
-        <p:nvSpPr>
-          <p:cNvPr id="3" name="Textfeld 2">
-            <a:extLst>
-              <a:ext uri="{FF2B5EF4-FFF2-40B4-BE49-F238E27FC236}">
-                <a16:creationId xmlns:a16="http://schemas.microsoft.com/office/drawing/2014/main" id="{7E1251E1-32ED-21F2-7044-F9161984C14B}"/>
+      <p:cxnSp>
+        <p:nvCxnSpPr>
+          <p:cNvPr id="8" name="Gerader Verbinder 7">
+            <a:extLst>
+              <a:ext uri="{FF2B5EF4-FFF2-40B4-BE49-F238E27FC236}">
+                <a16:creationId xmlns:a16="http://schemas.microsoft.com/office/drawing/2014/main" id="{A967309D-E383-F13E-1D3E-DCADD492DBB9}"/>
+              </a:ext>
+            </a:extLst>
+          </p:cNvPr>
+          <p:cNvCxnSpPr>
+            <a:cxnSpLocks/>
+          </p:cNvCxnSpPr>
+          <p:nvPr/>
+        </p:nvCxnSpPr>
+        <p:spPr>
+          <a:xfrm>
+            <a:off x="288236" y="6530009"/>
+            <a:ext cx="11589026" cy="0"/>
+          </a:xfrm>
+          <a:prstGeom prst="line">
+            <a:avLst/>
+          </a:prstGeom>
+          <a:ln w="12700">
+            <a:solidFill>
+              <a:srgbClr val="808080"/>
+            </a:solidFill>
+          </a:ln>
+        </p:spPr>
+        <p:style>
+          <a:lnRef idx="1">
+            <a:schemeClr val="accent1"/>
+          </a:lnRef>
+          <a:fillRef idx="0">
+            <a:schemeClr val="accent1"/>
+          </a:fillRef>
+          <a:effectRef idx="0">
+            <a:schemeClr val="accent1"/>
+          </a:effectRef>
+          <a:fontRef idx="minor">
+            <a:schemeClr val="tx1"/>
+          </a:fontRef>
+        </p:style>
+      </p:cxnSp>
+      <p:sp>
+        <p:nvSpPr>
+          <p:cNvPr id="14" name="Textfeld 13">
+            <a:extLst>
+              <a:ext uri="{FF2B5EF4-FFF2-40B4-BE49-F238E27FC236}">
+                <a16:creationId xmlns:a16="http://schemas.microsoft.com/office/drawing/2014/main" id="{D2AF56CB-7B24-1286-5C9D-66DEEEA02F0F}"/>
               </a:ext>
             </a:extLst>
           </p:cNvPr>
@@ -4979,8 +5036,8 @@
         </p:nvSpPr>
         <p:spPr>
           <a:xfrm>
-            <a:off x="834886" y="655983"/>
-            <a:ext cx="2435087" cy="769441"/>
+            <a:off x="268358" y="6561123"/>
+            <a:ext cx="11589026" cy="276999"/>
           </a:xfrm>
           <a:prstGeom prst="rect">
             <a:avLst/>
@@ -4994,12 +5051,247 @@
           <a:lstStyle/>
           <a:p>
             <a:r>
-              <a:rPr lang="en-US" sz="4400" b="1" dirty="0">
+              <a:rPr lang="en-US" sz="1200" dirty="0">
+                <a:solidFill>
+                  <a:srgbClr val="3D597C"/>
+                </a:solidFill>
+              </a:rPr>
+              <a:t>Proteome-wide Screen for RNA-dependent Proteins I Team 3: HeLa Cells Synchronized in Interphase I Summer Term 2023 I 19.07.2023 I Supervisor: Dr. Ma</a:t>
+            </a:r>
+            <a:r>
+              <a:rPr lang="de-DE" sz="1200" dirty="0">
+                <a:solidFill>
+                  <a:srgbClr val="3D597C"/>
+                </a:solidFill>
+              </a:rPr>
+              <a:t>ï</a:t>
+            </a:r>
+            <a:r>
+              <a:rPr lang="en-US" sz="1200" dirty="0">
+                <a:solidFill>
+                  <a:srgbClr val="3D597C"/>
+                </a:solidFill>
+              </a:rPr>
+              <a:t>wen Caudron-Herger</a:t>
+            </a:r>
+          </a:p>
+        </p:txBody>
+      </p:sp>
+      <p:sp>
+        <p:nvSpPr>
+          <p:cNvPr id="3" name="Textfeld 2">
+            <a:extLst>
+              <a:ext uri="{FF2B5EF4-FFF2-40B4-BE49-F238E27FC236}">
+                <a16:creationId xmlns:a16="http://schemas.microsoft.com/office/drawing/2014/main" id="{3BF84B42-8642-B5E9-DB4C-97123A5349C0}"/>
+              </a:ext>
+            </a:extLst>
+          </p:cNvPr>
+          <p:cNvSpPr txBox="1"/>
+          <p:nvPr/>
+        </p:nvSpPr>
+        <p:spPr>
+          <a:xfrm>
+            <a:off x="298175" y="123446"/>
+            <a:ext cx="5807764" cy="369332"/>
+          </a:xfrm>
+          <a:prstGeom prst="rect">
+            <a:avLst/>
+          </a:prstGeom>
+          <a:noFill/>
+        </p:spPr>
+        <p:txBody>
+          <a:bodyPr wrap="square" rtlCol="0">
+            <a:spAutoFit/>
+          </a:bodyPr>
+          <a:lstStyle/>
+          <a:p>
+            <a:r>
+              <a:rPr lang="en-US" dirty="0">
+                <a:solidFill>
+                  <a:srgbClr val="808080"/>
+                </a:solidFill>
+              </a:rPr>
+              <a:t>Biological Background  </a:t>
+            </a:r>
+            <a:r>
+              <a:rPr lang="en-US" dirty="0">
+                <a:solidFill>
+                  <a:srgbClr val="808080"/>
+                </a:solidFill>
+                <a:sym typeface="Symbol" panose="05050102010706020507" pitchFamily="18" charset="2"/>
+              </a:rPr>
+              <a:t>  Methods    Results    </a:t>
+            </a:r>
+            <a:r>
+              <a:rPr lang="en-US" dirty="0">
+                <a:sym typeface="Symbol" panose="05050102010706020507" pitchFamily="18" charset="2"/>
+              </a:rPr>
+              <a:t>Outlook </a:t>
+            </a:r>
+            <a:endParaRPr lang="en-US" dirty="0"/>
+          </a:p>
+        </p:txBody>
+      </p:sp>
+      <p:sp>
+        <p:nvSpPr>
+          <p:cNvPr id="4" name="Textfeld 3">
+            <a:extLst>
+              <a:ext uri="{FF2B5EF4-FFF2-40B4-BE49-F238E27FC236}">
+                <a16:creationId xmlns:a16="http://schemas.microsoft.com/office/drawing/2014/main" id="{F88CB21D-319C-FF63-3712-B58E05662E98}"/>
+              </a:ext>
+            </a:extLst>
+          </p:cNvPr>
+          <p:cNvSpPr txBox="1"/>
+          <p:nvPr/>
+        </p:nvSpPr>
+        <p:spPr>
+          <a:xfrm>
+            <a:off x="11499574" y="95075"/>
+            <a:ext cx="516835" cy="369332"/>
+          </a:xfrm>
+          <a:prstGeom prst="rect">
+            <a:avLst/>
+          </a:prstGeom>
+          <a:noFill/>
+        </p:spPr>
+        <p:txBody>
+          <a:bodyPr wrap="square" rtlCol="0">
+            <a:spAutoFit/>
+          </a:bodyPr>
+          <a:lstStyle/>
+          <a:p>
+            <a:r>
+              <a:rPr lang="en-US" dirty="0"/>
+              <a:t>15</a:t>
+            </a:r>
+          </a:p>
+        </p:txBody>
+      </p:sp>
+      <p:sp>
+        <p:nvSpPr>
+          <p:cNvPr id="5" name="Textfeld 4">
+            <a:extLst>
+              <a:ext uri="{FF2B5EF4-FFF2-40B4-BE49-F238E27FC236}">
+                <a16:creationId xmlns:a16="http://schemas.microsoft.com/office/drawing/2014/main" id="{9D35D034-ED1A-471C-5799-E3DE44D512F9}"/>
+              </a:ext>
+            </a:extLst>
+          </p:cNvPr>
+          <p:cNvSpPr txBox="1"/>
+          <p:nvPr/>
+        </p:nvSpPr>
+        <p:spPr>
+          <a:xfrm>
+            <a:off x="288235" y="6244511"/>
+            <a:ext cx="11728173" cy="276999"/>
+          </a:xfrm>
+          <a:prstGeom prst="rect">
+            <a:avLst/>
+          </a:prstGeom>
+          <a:noFill/>
+        </p:spPr>
+        <p:txBody>
+          <a:bodyPr wrap="square" rtlCol="0">
+            <a:spAutoFit/>
+          </a:bodyPr>
+          <a:lstStyle/>
+          <a:p>
+            <a:r>
+              <a:rPr lang="en-US" sz="1200" dirty="0">
+                <a:solidFill>
+                  <a:srgbClr val="808080"/>
+                </a:solidFill>
+              </a:rPr>
+              <a:t># Source # </a:t>
+            </a:r>
+          </a:p>
+        </p:txBody>
+      </p:sp>
+      <p:sp>
+        <p:nvSpPr>
+          <p:cNvPr id="6" name="Textfeld 5">
+            <a:extLst>
+              <a:ext uri="{FF2B5EF4-FFF2-40B4-BE49-F238E27FC236}">
+                <a16:creationId xmlns:a16="http://schemas.microsoft.com/office/drawing/2014/main" id="{D71BBC45-186F-5C75-2B25-BA75DF442F61}"/>
+              </a:ext>
+            </a:extLst>
+          </p:cNvPr>
+          <p:cNvSpPr txBox="1"/>
+          <p:nvPr/>
+        </p:nvSpPr>
+        <p:spPr>
+          <a:xfrm>
+            <a:off x="298175" y="586410"/>
+            <a:ext cx="11579087" cy="707886"/>
+          </a:xfrm>
+          <a:prstGeom prst="rect">
+            <a:avLst/>
+          </a:prstGeom>
+          <a:noFill/>
+        </p:spPr>
+        <p:txBody>
+          <a:bodyPr wrap="square" rtlCol="0">
+            <a:spAutoFit/>
+          </a:bodyPr>
+          <a:lstStyle/>
+          <a:p>
+            <a:r>
+              <a:rPr lang="en-US" sz="4000" b="1" dirty="0">
                 <a:solidFill>
                   <a:schemeClr val="bg1"/>
                 </a:solidFill>
               </a:rPr>
-              <a:t>Backup</a:t>
+              <a:t># </a:t>
+            </a:r>
+            <a:r>
+              <a:rPr lang="en-US" sz="4000" b="1" dirty="0" err="1">
+                <a:solidFill>
+                  <a:schemeClr val="bg1"/>
+                </a:solidFill>
+              </a:rPr>
+              <a:t>Überschrift</a:t>
+            </a:r>
+            <a:r>
+              <a:rPr lang="en-US" sz="4000" b="1" dirty="0">
+                <a:solidFill>
+                  <a:schemeClr val="bg1"/>
+                </a:solidFill>
+              </a:rPr>
+              <a:t> #</a:t>
+            </a:r>
+          </a:p>
+        </p:txBody>
+      </p:sp>
+      <p:sp>
+        <p:nvSpPr>
+          <p:cNvPr id="7" name="Textfeld 6">
+            <a:extLst>
+              <a:ext uri="{FF2B5EF4-FFF2-40B4-BE49-F238E27FC236}">
+                <a16:creationId xmlns:a16="http://schemas.microsoft.com/office/drawing/2014/main" id="{D4D41EAA-9717-E025-5E23-D9943B1D82FC}"/>
+              </a:ext>
+            </a:extLst>
+          </p:cNvPr>
+          <p:cNvSpPr txBox="1"/>
+          <p:nvPr/>
+        </p:nvSpPr>
+        <p:spPr>
+          <a:xfrm>
+            <a:off x="288235" y="1610139"/>
+            <a:ext cx="11589026" cy="400110"/>
+          </a:xfrm>
+          <a:prstGeom prst="rect">
+            <a:avLst/>
+          </a:prstGeom>
+          <a:noFill/>
+        </p:spPr>
+        <p:txBody>
+          <a:bodyPr wrap="square" rtlCol="0">
+            <a:spAutoFit/>
+          </a:bodyPr>
+          <a:lstStyle/>
+          <a:p>
+            <a:r>
+              <a:rPr lang="en-US" sz="2000" dirty="0"/>
+              <a:t># Text #</a:t>
             </a:r>
           </a:p>
         </p:txBody>
@@ -5007,7 +5299,7 @@
     </p:spTree>
     <p:extLst>
       <p:ext uri="{BB962C8B-B14F-4D97-AF65-F5344CB8AC3E}">
-        <p14:creationId xmlns:p14="http://schemas.microsoft.com/office/powerpoint/2010/main" val="4087225167"/>
+        <p14:creationId xmlns:p14="http://schemas.microsoft.com/office/powerpoint/2010/main" val="3351326044"/>
       </p:ext>
     </p:extLst>
   </p:cSld>
@@ -5048,8 +5340,8 @@
         </p:nvSpPr>
         <p:spPr>
           <a:xfrm>
-            <a:off x="288236" y="496958"/>
-            <a:ext cx="11589026" cy="884582"/>
+            <a:off x="288236" y="268357"/>
+            <a:ext cx="11589026" cy="6301409"/>
           </a:xfrm>
           <a:prstGeom prst="rect">
             <a:avLst/>
@@ -5086,6 +5378,127 @@
           </a:p>
         </p:txBody>
       </p:sp>
+      <p:sp>
+        <p:nvSpPr>
+          <p:cNvPr id="3" name="Textfeld 2">
+            <a:extLst>
+              <a:ext uri="{FF2B5EF4-FFF2-40B4-BE49-F238E27FC236}">
+                <a16:creationId xmlns:a16="http://schemas.microsoft.com/office/drawing/2014/main" id="{7E1251E1-32ED-21F2-7044-F9161984C14B}"/>
+              </a:ext>
+            </a:extLst>
+          </p:cNvPr>
+          <p:cNvSpPr txBox="1"/>
+          <p:nvPr/>
+        </p:nvSpPr>
+        <p:spPr>
+          <a:xfrm>
+            <a:off x="834886" y="655983"/>
+            <a:ext cx="2435087" cy="769441"/>
+          </a:xfrm>
+          <a:prstGeom prst="rect">
+            <a:avLst/>
+          </a:prstGeom>
+          <a:noFill/>
+        </p:spPr>
+        <p:txBody>
+          <a:bodyPr wrap="square" rtlCol="0">
+            <a:spAutoFit/>
+          </a:bodyPr>
+          <a:lstStyle/>
+          <a:p>
+            <a:r>
+              <a:rPr lang="en-US" sz="4400" b="1" dirty="0">
+                <a:solidFill>
+                  <a:schemeClr val="bg1"/>
+                </a:solidFill>
+              </a:rPr>
+              <a:t>Backup</a:t>
+            </a:r>
+          </a:p>
+        </p:txBody>
+      </p:sp>
+    </p:spTree>
+    <p:extLst>
+      <p:ext uri="{BB962C8B-B14F-4D97-AF65-F5344CB8AC3E}">
+        <p14:creationId xmlns:p14="http://schemas.microsoft.com/office/powerpoint/2010/main" val="4087225167"/>
+      </p:ext>
+    </p:extLst>
+  </p:cSld>
+  <p:clrMapOvr>
+    <a:masterClrMapping/>
+  </p:clrMapOvr>
+</p:sld>
+</file>
+
+<file path=ppt/slides/slide7.xml><?xml version="1.0" encoding="utf-8"?>
+<p:sld xmlns:a="http://schemas.openxmlformats.org/drawingml/2006/main" xmlns:r="http://schemas.openxmlformats.org/officeDocument/2006/relationships" xmlns:p="http://schemas.openxmlformats.org/presentationml/2006/main">
+  <p:cSld>
+    <p:spTree>
+      <p:nvGrpSpPr>
+        <p:cNvPr id="1" name=""/>
+        <p:cNvGrpSpPr/>
+        <p:nvPr/>
+      </p:nvGrpSpPr>
+      <p:grpSpPr>
+        <a:xfrm>
+          <a:off x="0" y="0"/>
+          <a:ext cx="0" cy="0"/>
+          <a:chOff x="0" y="0"/>
+          <a:chExt cx="0" cy="0"/>
+        </a:xfrm>
+      </p:grpSpPr>
+      <p:sp>
+        <p:nvSpPr>
+          <p:cNvPr id="2" name="Rechteck 1">
+            <a:extLst>
+              <a:ext uri="{FF2B5EF4-FFF2-40B4-BE49-F238E27FC236}">
+                <a16:creationId xmlns:a16="http://schemas.microsoft.com/office/drawing/2014/main" id="{4923676B-AAED-C154-C21D-FCE15F839EEE}"/>
+              </a:ext>
+            </a:extLst>
+          </p:cNvPr>
+          <p:cNvSpPr/>
+          <p:nvPr/>
+        </p:nvSpPr>
+        <p:spPr>
+          <a:xfrm>
+            <a:off x="288236" y="496958"/>
+            <a:ext cx="11589026" cy="884582"/>
+          </a:xfrm>
+          <a:prstGeom prst="rect">
+            <a:avLst/>
+          </a:prstGeom>
+          <a:solidFill>
+            <a:srgbClr val="3D597C"/>
+          </a:solidFill>
+          <a:ln>
+            <a:noFill/>
+          </a:ln>
+        </p:spPr>
+        <p:style>
+          <a:lnRef idx="2">
+            <a:schemeClr val="accent1">
+              <a:shade val="15000"/>
+            </a:schemeClr>
+          </a:lnRef>
+          <a:fillRef idx="1">
+            <a:schemeClr val="accent1"/>
+          </a:fillRef>
+          <a:effectRef idx="0">
+            <a:schemeClr val="accent1"/>
+          </a:effectRef>
+          <a:fontRef idx="minor">
+            <a:schemeClr val="lt1"/>
+          </a:fontRef>
+        </p:style>
+        <p:txBody>
+          <a:bodyPr rtlCol="0" anchor="ctr"/>
+          <a:lstStyle/>
+          <a:p>
+            <a:pPr algn="ctr"/>
+            <a:endParaRPr lang="en-US"/>
+          </a:p>
+        </p:txBody>
+      </p:sp>
       <p:cxnSp>
         <p:nvCxnSpPr>
           <p:cNvPr id="8" name="Gerader Verbinder 7">
@@ -5218,7 +5631,24 @@
                   <a:srgbClr val="808080"/>
                 </a:solidFill>
               </a:rPr>
-              <a:t>Biological Background  </a:t>
+              <a:t>Biological Background</a:t>
+            </a:r>
+            <a:r>
+              <a:rPr lang="en-US" dirty="0">
+                <a:solidFill>
+                  <a:srgbClr val="808080"/>
+                </a:solidFill>
+                <a:sym typeface="Symbol" panose="05050102010706020507" pitchFamily="18" charset="2"/>
+              </a:rPr>
+              <a:t>    Methods</a:t>
+            </a:r>
+            <a:r>
+              <a:rPr lang="en-US" dirty="0">
+                <a:solidFill>
+                  <a:srgbClr val="808080"/>
+                </a:solidFill>
+              </a:rPr>
+              <a:t>  </a:t>
             </a:r>
             <a:r>
               <a:rPr lang="en-US" dirty="0">

</xml_diff>